<commit_message>
more on VS in Tools slides
</commit_message>
<xml_diff>
--- a/Tools.pptx
+++ b/Tools.pptx
@@ -21,6 +21,14 @@
     <p:sldId id="274" r:id="rId15"/>
     <p:sldId id="273" r:id="rId16"/>
     <p:sldId id="275" r:id="rId17"/>
+    <p:sldId id="279" r:id="rId18"/>
+    <p:sldId id="281" r:id="rId19"/>
+    <p:sldId id="277" r:id="rId20"/>
+    <p:sldId id="278" r:id="rId21"/>
+    <p:sldId id="280" r:id="rId22"/>
+    <p:sldId id="282" r:id="rId23"/>
+    <p:sldId id="283" r:id="rId24"/>
+    <p:sldId id="284" r:id="rId25"/>
   </p:sldIdLst>
   <p:sldSz cx="9144000" cy="6858000" type="screen4x3"/>
   <p:notesSz cx="6858000" cy="9144000"/>
@@ -258,7 +266,7 @@
           <a:p>
             <a:fld id="{3EF5A353-26E6-402B-B05F-A9C38FAF514A}" type="datetimeFigureOut">
               <a:rPr lang="ru-RU" smtClean="0"/>
-              <a:t>28.04.2015</a:t>
+              <a:t>30.04.2015</a:t>
             </a:fld>
             <a:endParaRPr lang="ru-RU"/>
           </a:p>
@@ -428,7 +436,7 @@
           <a:p>
             <a:fld id="{3EF5A353-26E6-402B-B05F-A9C38FAF514A}" type="datetimeFigureOut">
               <a:rPr lang="ru-RU" smtClean="0"/>
-              <a:t>28.04.2015</a:t>
+              <a:t>30.04.2015</a:t>
             </a:fld>
             <a:endParaRPr lang="ru-RU"/>
           </a:p>
@@ -608,7 +616,7 @@
           <a:p>
             <a:fld id="{3EF5A353-26E6-402B-B05F-A9C38FAF514A}" type="datetimeFigureOut">
               <a:rPr lang="ru-RU" smtClean="0"/>
-              <a:t>28.04.2015</a:t>
+              <a:t>30.04.2015</a:t>
             </a:fld>
             <a:endParaRPr lang="ru-RU"/>
           </a:p>
@@ -778,7 +786,7 @@
           <a:p>
             <a:fld id="{3EF5A353-26E6-402B-B05F-A9C38FAF514A}" type="datetimeFigureOut">
               <a:rPr lang="ru-RU" smtClean="0"/>
-              <a:t>28.04.2015</a:t>
+              <a:t>30.04.2015</a:t>
             </a:fld>
             <a:endParaRPr lang="ru-RU"/>
           </a:p>
@@ -1022,7 +1030,7 @@
           <a:p>
             <a:fld id="{3EF5A353-26E6-402B-B05F-A9C38FAF514A}" type="datetimeFigureOut">
               <a:rPr lang="ru-RU" smtClean="0"/>
-              <a:t>28.04.2015</a:t>
+              <a:t>30.04.2015</a:t>
             </a:fld>
             <a:endParaRPr lang="ru-RU"/>
           </a:p>
@@ -1254,7 +1262,7 @@
           <a:p>
             <a:fld id="{3EF5A353-26E6-402B-B05F-A9C38FAF514A}" type="datetimeFigureOut">
               <a:rPr lang="ru-RU" smtClean="0"/>
-              <a:t>28.04.2015</a:t>
+              <a:t>30.04.2015</a:t>
             </a:fld>
             <a:endParaRPr lang="ru-RU"/>
           </a:p>
@@ -1621,7 +1629,7 @@
           <a:p>
             <a:fld id="{3EF5A353-26E6-402B-B05F-A9C38FAF514A}" type="datetimeFigureOut">
               <a:rPr lang="ru-RU" smtClean="0"/>
-              <a:t>28.04.2015</a:t>
+              <a:t>30.04.2015</a:t>
             </a:fld>
             <a:endParaRPr lang="ru-RU"/>
           </a:p>
@@ -1739,7 +1747,7 @@
           <a:p>
             <a:fld id="{3EF5A353-26E6-402B-B05F-A9C38FAF514A}" type="datetimeFigureOut">
               <a:rPr lang="ru-RU" smtClean="0"/>
-              <a:t>28.04.2015</a:t>
+              <a:t>30.04.2015</a:t>
             </a:fld>
             <a:endParaRPr lang="ru-RU"/>
           </a:p>
@@ -1834,7 +1842,7 @@
           <a:p>
             <a:fld id="{3EF5A353-26E6-402B-B05F-A9C38FAF514A}" type="datetimeFigureOut">
               <a:rPr lang="ru-RU" smtClean="0"/>
-              <a:t>28.04.2015</a:t>
+              <a:t>30.04.2015</a:t>
             </a:fld>
             <a:endParaRPr lang="ru-RU"/>
           </a:p>
@@ -2111,7 +2119,7 @@
           <a:p>
             <a:fld id="{3EF5A353-26E6-402B-B05F-A9C38FAF514A}" type="datetimeFigureOut">
               <a:rPr lang="ru-RU" smtClean="0"/>
-              <a:t>28.04.2015</a:t>
+              <a:t>30.04.2015</a:t>
             </a:fld>
             <a:endParaRPr lang="ru-RU"/>
           </a:p>
@@ -2368,7 +2376,7 @@
           <a:p>
             <a:fld id="{3EF5A353-26E6-402B-B05F-A9C38FAF514A}" type="datetimeFigureOut">
               <a:rPr lang="ru-RU" smtClean="0"/>
-              <a:t>28.04.2015</a:t>
+              <a:t>30.04.2015</a:t>
             </a:fld>
             <a:endParaRPr lang="ru-RU"/>
           </a:p>
@@ -2581,7 +2589,7 @@
           <a:p>
             <a:fld id="{3EF5A353-26E6-402B-B05F-A9C38FAF514A}" type="datetimeFigureOut">
               <a:rPr lang="ru-RU" smtClean="0"/>
-              <a:t>28.04.2015</a:t>
+              <a:t>30.04.2015</a:t>
             </a:fld>
             <a:endParaRPr lang="ru-RU"/>
           </a:p>
@@ -3955,12 +3963,13 @@
             </a:r>
             <a:r>
               <a:rPr lang="en-US" dirty="0" err="1" smtClean="0"/>
-              <a:t>Ctrl+Alt+L</a:t>
+              <a:t>Shift+Alt+L</a:t>
             </a:r>
             <a:r>
               <a:rPr lang="en-US" dirty="0" smtClean="0"/>
               <a:t> </a:t>
             </a:r>
+            <a:endParaRPr lang="en-US" dirty="0" smtClean="0"/>
           </a:p>
         </p:txBody>
       </p:sp>
@@ -4425,6 +4434,361 @@
 </p:sld>
 </file>
 
+<file path=ppt/slides/slide17.xml><?xml version="1.0" encoding="utf-8"?>
+<p:sld xmlns:a="http://schemas.openxmlformats.org/drawingml/2006/main" xmlns:r="http://schemas.openxmlformats.org/officeDocument/2006/relationships" xmlns:p="http://schemas.openxmlformats.org/presentationml/2006/main">
+  <p:cSld>
+    <p:spTree>
+      <p:nvGrpSpPr>
+        <p:cNvPr id="1" name=""/>
+        <p:cNvGrpSpPr/>
+        <p:nvPr/>
+      </p:nvGrpSpPr>
+      <p:grpSpPr>
+        <a:xfrm>
+          <a:off x="0" y="0"/>
+          <a:ext cx="0" cy="0"/>
+          <a:chOff x="0" y="0"/>
+          <a:chExt cx="0" cy="0"/>
+        </a:xfrm>
+      </p:grpSpPr>
+      <p:sp>
+        <p:nvSpPr>
+          <p:cNvPr id="2" name="Заголовок 1"/>
+          <p:cNvSpPr>
+            <a:spLocks noGrp="1"/>
+          </p:cNvSpPr>
+          <p:nvPr>
+            <p:ph type="title"/>
+          </p:nvPr>
+        </p:nvSpPr>
+        <p:spPr/>
+        <p:txBody>
+          <a:bodyPr/>
+          <a:lstStyle/>
+          <a:p>
+            <a:r>
+              <a:rPr lang="ru-RU" dirty="0" smtClean="0"/>
+              <a:t>Прочее</a:t>
+            </a:r>
+            <a:endParaRPr lang="ru-RU" dirty="0"/>
+          </a:p>
+        </p:txBody>
+      </p:sp>
+      <p:sp>
+        <p:nvSpPr>
+          <p:cNvPr id="3" name="Объект 2"/>
+          <p:cNvSpPr>
+            <a:spLocks noGrp="1"/>
+          </p:cNvSpPr>
+          <p:nvPr>
+            <p:ph idx="1"/>
+          </p:nvPr>
+        </p:nvSpPr>
+        <p:spPr/>
+        <p:txBody>
+          <a:bodyPr/>
+          <a:lstStyle/>
+          <a:p>
+            <a:endParaRPr lang="ru-RU"/>
+          </a:p>
+        </p:txBody>
+      </p:sp>
+    </p:spTree>
+    <p:extLst>
+      <p:ext uri="{BB962C8B-B14F-4D97-AF65-F5344CB8AC3E}">
+        <p14:creationId xmlns:p14="http://schemas.microsoft.com/office/powerpoint/2010/main" val="4282947520"/>
+      </p:ext>
+    </p:extLst>
+  </p:cSld>
+  <p:clrMapOvr>
+    <a:masterClrMapping/>
+  </p:clrMapOvr>
+  <p:timing>
+    <p:tnLst>
+      <p:par>
+        <p:cTn id="1" dur="indefinite" restart="never" nodeType="tmRoot"/>
+      </p:par>
+    </p:tnLst>
+  </p:timing>
+</p:sld>
+</file>
+
+<file path=ppt/slides/slide18.xml><?xml version="1.0" encoding="utf-8"?>
+<p:sld xmlns:a="http://schemas.openxmlformats.org/drawingml/2006/main" xmlns:r="http://schemas.openxmlformats.org/officeDocument/2006/relationships" xmlns:p="http://schemas.openxmlformats.org/presentationml/2006/main">
+  <p:cSld>
+    <p:spTree>
+      <p:nvGrpSpPr>
+        <p:cNvPr id="1" name=""/>
+        <p:cNvGrpSpPr/>
+        <p:nvPr/>
+      </p:nvGrpSpPr>
+      <p:grpSpPr>
+        <a:xfrm>
+          <a:off x="0" y="0"/>
+          <a:ext cx="0" cy="0"/>
+          <a:chOff x="0" y="0"/>
+          <a:chExt cx="0" cy="0"/>
+        </a:xfrm>
+      </p:grpSpPr>
+      <p:sp>
+        <p:nvSpPr>
+          <p:cNvPr id="2" name="Заголовок 1"/>
+          <p:cNvSpPr>
+            <a:spLocks noGrp="1"/>
+          </p:cNvSpPr>
+          <p:nvPr>
+            <p:ph type="title"/>
+          </p:nvPr>
+        </p:nvSpPr>
+        <p:spPr/>
+        <p:txBody>
+          <a:bodyPr/>
+          <a:lstStyle/>
+          <a:p>
+            <a:r>
+              <a:rPr lang="ru-RU" dirty="0" smtClean="0"/>
+              <a:t>Где искать пропавшие окошки?</a:t>
+            </a:r>
+            <a:endParaRPr lang="ru-RU" dirty="0"/>
+          </a:p>
+        </p:txBody>
+      </p:sp>
+      <p:sp>
+        <p:nvSpPr>
+          <p:cNvPr id="3" name="Объект 2"/>
+          <p:cNvSpPr>
+            <a:spLocks noGrp="1"/>
+          </p:cNvSpPr>
+          <p:nvPr>
+            <p:ph idx="1"/>
+          </p:nvPr>
+        </p:nvSpPr>
+        <p:spPr/>
+        <p:txBody>
+          <a:bodyPr/>
+          <a:lstStyle/>
+          <a:p>
+            <a:r>
+              <a:rPr lang="ru-RU" dirty="0" smtClean="0"/>
+              <a:t>Открыть </a:t>
+            </a:r>
+            <a:r>
+              <a:rPr lang="en-US" dirty="0" smtClean="0"/>
+              <a:t>Solution </a:t>
+            </a:r>
+            <a:r>
+              <a:rPr lang="en-US" dirty="0"/>
+              <a:t>Explorer </a:t>
+            </a:r>
+            <a:r>
+              <a:rPr lang="en-US" dirty="0" err="1" smtClean="0"/>
+              <a:t>Ctrl+Alt+L</a:t>
+            </a:r>
+            <a:r>
+              <a:rPr lang="en-US" dirty="0" smtClean="0"/>
+              <a:t> </a:t>
+            </a:r>
+          </a:p>
+          <a:p>
+            <a:r>
+              <a:rPr lang="en-US" dirty="0" smtClean="0"/>
+              <a:t>View | Other Windows</a:t>
+            </a:r>
+          </a:p>
+          <a:p>
+            <a:r>
+              <a:rPr lang="en-US" dirty="0" err="1" smtClean="0"/>
+              <a:t>Resharper</a:t>
+            </a:r>
+            <a:r>
+              <a:rPr lang="en-US" dirty="0" smtClean="0"/>
+              <a:t> | Window</a:t>
+            </a:r>
+            <a:endParaRPr lang="en-US" dirty="0"/>
+          </a:p>
+          <a:p>
+            <a:endParaRPr lang="ru-RU" dirty="0"/>
+          </a:p>
+        </p:txBody>
+      </p:sp>
+      <p:pic>
+        <p:nvPicPr>
+          <p:cNvPr id="4" name="Рисунок 3"/>
+          <p:cNvPicPr>
+            <a:picLocks noChangeAspect="1"/>
+          </p:cNvPicPr>
+          <p:nvPr/>
+        </p:nvPicPr>
+        <p:blipFill>
+          <a:blip r:embed="rId2"/>
+          <a:stretch>
+            <a:fillRect/>
+          </a:stretch>
+        </p:blipFill>
+        <p:spPr>
+          <a:xfrm>
+            <a:off x="4350143" y="2392067"/>
+            <a:ext cx="6477000" cy="4657725"/>
+          </a:xfrm>
+          <a:prstGeom prst="rect">
+            <a:avLst/>
+          </a:prstGeom>
+        </p:spPr>
+      </p:pic>
+    </p:spTree>
+    <p:extLst>
+      <p:ext uri="{BB962C8B-B14F-4D97-AF65-F5344CB8AC3E}">
+        <p14:creationId xmlns:p14="http://schemas.microsoft.com/office/powerpoint/2010/main" val="1802141749"/>
+      </p:ext>
+    </p:extLst>
+  </p:cSld>
+  <p:clrMapOvr>
+    <a:masterClrMapping/>
+  </p:clrMapOvr>
+  <p:timing>
+    <p:tnLst>
+      <p:par>
+        <p:cTn id="1" dur="indefinite" restart="never" nodeType="tmRoot"/>
+      </p:par>
+    </p:tnLst>
+  </p:timing>
+</p:sld>
+</file>
+
+<file path=ppt/slides/slide19.xml><?xml version="1.0" encoding="utf-8"?>
+<p:sld xmlns:a="http://schemas.openxmlformats.org/drawingml/2006/main" xmlns:r="http://schemas.openxmlformats.org/officeDocument/2006/relationships" xmlns:p="http://schemas.openxmlformats.org/presentationml/2006/main">
+  <p:cSld>
+    <p:spTree>
+      <p:nvGrpSpPr>
+        <p:cNvPr id="1" name=""/>
+        <p:cNvGrpSpPr/>
+        <p:nvPr/>
+      </p:nvGrpSpPr>
+      <p:grpSpPr>
+        <a:xfrm>
+          <a:off x="0" y="0"/>
+          <a:ext cx="0" cy="0"/>
+          <a:chOff x="0" y="0"/>
+          <a:chExt cx="0" cy="0"/>
+        </a:xfrm>
+      </p:grpSpPr>
+      <p:sp>
+        <p:nvSpPr>
+          <p:cNvPr id="2" name="Заголовок 1"/>
+          <p:cNvSpPr>
+            <a:spLocks noGrp="1"/>
+          </p:cNvSpPr>
+          <p:nvPr>
+            <p:ph type="title"/>
+          </p:nvPr>
+        </p:nvSpPr>
+        <p:spPr/>
+        <p:txBody>
+          <a:bodyPr/>
+          <a:lstStyle/>
+          <a:p>
+            <a:r>
+              <a:rPr lang="en-US" dirty="0" smtClean="0"/>
+              <a:t>Set </a:t>
+            </a:r>
+            <a:r>
+              <a:rPr lang="en-US" dirty="0" err="1" smtClean="0"/>
+              <a:t>StartUp</a:t>
+            </a:r>
+            <a:r>
+              <a:rPr lang="en-US" dirty="0" smtClean="0"/>
+              <a:t> Project</a:t>
+            </a:r>
+            <a:endParaRPr lang="ru-RU" dirty="0"/>
+          </a:p>
+        </p:txBody>
+      </p:sp>
+      <p:pic>
+        <p:nvPicPr>
+          <p:cNvPr id="4" name="Объект 3"/>
+          <p:cNvPicPr>
+            <a:picLocks noGrp="1" noChangeAspect="1"/>
+          </p:cNvPicPr>
+          <p:nvPr>
+            <p:ph idx="1"/>
+          </p:nvPr>
+        </p:nvPicPr>
+        <p:blipFill>
+          <a:blip r:embed="rId2"/>
+          <a:stretch>
+            <a:fillRect/>
+          </a:stretch>
+        </p:blipFill>
+        <p:spPr>
+          <a:xfrm>
+            <a:off x="721374" y="1569854"/>
+            <a:ext cx="7701252" cy="4825593"/>
+          </a:xfrm>
+          <a:prstGeom prst="rect">
+            <a:avLst/>
+          </a:prstGeom>
+        </p:spPr>
+      </p:pic>
+      <p:sp>
+        <p:nvSpPr>
+          <p:cNvPr id="5" name="Стрелка вправо 4"/>
+          <p:cNvSpPr/>
+          <p:nvPr/>
+        </p:nvSpPr>
+        <p:spPr>
+          <a:xfrm flipH="1">
+            <a:off x="3965097" y="2095837"/>
+            <a:ext cx="1521303" cy="571730"/>
+          </a:xfrm>
+          <a:prstGeom prst="rightArrow">
+            <a:avLst/>
+          </a:prstGeom>
+        </p:spPr>
+        <p:style>
+          <a:lnRef idx="2">
+            <a:schemeClr val="accent2">
+              <a:shade val="50000"/>
+            </a:schemeClr>
+          </a:lnRef>
+          <a:fillRef idx="1">
+            <a:schemeClr val="accent2"/>
+          </a:fillRef>
+          <a:effectRef idx="0">
+            <a:schemeClr val="accent2"/>
+          </a:effectRef>
+          <a:fontRef idx="minor">
+            <a:schemeClr val="lt1"/>
+          </a:fontRef>
+        </p:style>
+        <p:txBody>
+          <a:bodyPr rtlCol="0" anchor="ctr"/>
+          <a:lstStyle/>
+          <a:p>
+            <a:pPr algn="ctr"/>
+            <a:endParaRPr lang="ru-RU"/>
+          </a:p>
+        </p:txBody>
+      </p:sp>
+    </p:spTree>
+    <p:extLst>
+      <p:ext uri="{BB962C8B-B14F-4D97-AF65-F5344CB8AC3E}">
+        <p14:creationId xmlns:p14="http://schemas.microsoft.com/office/powerpoint/2010/main" val="4095086328"/>
+      </p:ext>
+    </p:extLst>
+  </p:cSld>
+  <p:clrMapOvr>
+    <a:masterClrMapping/>
+  </p:clrMapOvr>
+  <p:timing>
+    <p:tnLst>
+      <p:par>
+        <p:cTn id="1" dur="indefinite" restart="never" nodeType="tmRoot"/>
+      </p:par>
+    </p:tnLst>
+  </p:timing>
+</p:sld>
+</file>
+
 <file path=ppt/slides/slide2.xml><?xml version="1.0" encoding="utf-8"?>
 <p:sld xmlns:a="http://schemas.openxmlformats.org/drawingml/2006/main" xmlns:r="http://schemas.openxmlformats.org/officeDocument/2006/relationships" xmlns:p="http://schemas.openxmlformats.org/presentationml/2006/main">
   <p:cSld>
@@ -4501,6 +4865,673 @@
       </p:par>
     </p:tnLst>
   </p:timing>
+</p:sld>
+</file>
+
+<file path=ppt/slides/slide20.xml><?xml version="1.0" encoding="utf-8"?>
+<p:sld xmlns:a="http://schemas.openxmlformats.org/drawingml/2006/main" xmlns:r="http://schemas.openxmlformats.org/officeDocument/2006/relationships" xmlns:p="http://schemas.openxmlformats.org/presentationml/2006/main">
+  <p:cSld>
+    <p:spTree>
+      <p:nvGrpSpPr>
+        <p:cNvPr id="1" name=""/>
+        <p:cNvGrpSpPr/>
+        <p:nvPr/>
+      </p:nvGrpSpPr>
+      <p:grpSpPr>
+        <a:xfrm>
+          <a:off x="0" y="0"/>
+          <a:ext cx="0" cy="0"/>
+          <a:chOff x="0" y="0"/>
+          <a:chExt cx="0" cy="0"/>
+        </a:xfrm>
+      </p:grpSpPr>
+      <p:sp>
+        <p:nvSpPr>
+          <p:cNvPr id="2" name="Заголовок 1"/>
+          <p:cNvSpPr>
+            <a:spLocks noGrp="1"/>
+          </p:cNvSpPr>
+          <p:nvPr>
+            <p:ph type="title"/>
+          </p:nvPr>
+        </p:nvSpPr>
+        <p:spPr/>
+        <p:txBody>
+          <a:bodyPr/>
+          <a:lstStyle/>
+          <a:p>
+            <a:r>
+              <a:rPr lang="en-US" dirty="0" smtClean="0"/>
+              <a:t>Copy To Output Directory</a:t>
+            </a:r>
+            <a:endParaRPr lang="ru-RU" dirty="0"/>
+          </a:p>
+        </p:txBody>
+      </p:sp>
+      <p:pic>
+        <p:nvPicPr>
+          <p:cNvPr id="4" name="Объект 3"/>
+          <p:cNvPicPr>
+            <a:picLocks noGrp="1" noChangeAspect="1"/>
+          </p:cNvPicPr>
+          <p:nvPr>
+            <p:ph idx="1"/>
+          </p:nvPr>
+        </p:nvPicPr>
+        <p:blipFill>
+          <a:blip r:embed="rId2"/>
+          <a:stretch>
+            <a:fillRect/>
+          </a:stretch>
+        </p:blipFill>
+        <p:spPr>
+          <a:xfrm>
+            <a:off x="1322985" y="1690689"/>
+            <a:ext cx="6498029" cy="3018876"/>
+          </a:xfrm>
+          <a:prstGeom prst="rect">
+            <a:avLst/>
+          </a:prstGeom>
+        </p:spPr>
+      </p:pic>
+      <p:sp>
+        <p:nvSpPr>
+          <p:cNvPr id="5" name="Стрелка вправо 4"/>
+          <p:cNvSpPr/>
+          <p:nvPr/>
+        </p:nvSpPr>
+        <p:spPr>
+          <a:xfrm flipH="1">
+            <a:off x="5559228" y="3552403"/>
+            <a:ext cx="1521303" cy="571730"/>
+          </a:xfrm>
+          <a:prstGeom prst="rightArrow">
+            <a:avLst/>
+          </a:prstGeom>
+        </p:spPr>
+        <p:style>
+          <a:lnRef idx="2">
+            <a:schemeClr val="accent2">
+              <a:shade val="50000"/>
+            </a:schemeClr>
+          </a:lnRef>
+          <a:fillRef idx="1">
+            <a:schemeClr val="accent2"/>
+          </a:fillRef>
+          <a:effectRef idx="0">
+            <a:schemeClr val="accent2"/>
+          </a:effectRef>
+          <a:fontRef idx="minor">
+            <a:schemeClr val="lt1"/>
+          </a:fontRef>
+        </p:style>
+        <p:txBody>
+          <a:bodyPr rtlCol="0" anchor="ctr"/>
+          <a:lstStyle/>
+          <a:p>
+            <a:pPr algn="ctr"/>
+            <a:endParaRPr lang="ru-RU"/>
+          </a:p>
+        </p:txBody>
+      </p:sp>
+    </p:spTree>
+    <p:extLst>
+      <p:ext uri="{BB962C8B-B14F-4D97-AF65-F5344CB8AC3E}">
+        <p14:creationId xmlns:p14="http://schemas.microsoft.com/office/powerpoint/2010/main" val="3068809529"/>
+      </p:ext>
+    </p:extLst>
+  </p:cSld>
+  <p:clrMapOvr>
+    <a:masterClrMapping/>
+  </p:clrMapOvr>
+</p:sld>
+</file>
+
+<file path=ppt/slides/slide21.xml><?xml version="1.0" encoding="utf-8"?>
+<p:sld xmlns:a="http://schemas.openxmlformats.org/drawingml/2006/main" xmlns:r="http://schemas.openxmlformats.org/officeDocument/2006/relationships" xmlns:p="http://schemas.openxmlformats.org/presentationml/2006/main">
+  <p:cSld>
+    <p:spTree>
+      <p:nvGrpSpPr>
+        <p:cNvPr id="1" name=""/>
+        <p:cNvGrpSpPr/>
+        <p:nvPr/>
+      </p:nvGrpSpPr>
+      <p:grpSpPr>
+        <a:xfrm>
+          <a:off x="0" y="0"/>
+          <a:ext cx="0" cy="0"/>
+          <a:chOff x="0" y="0"/>
+          <a:chExt cx="0" cy="0"/>
+        </a:xfrm>
+      </p:grpSpPr>
+      <p:sp>
+        <p:nvSpPr>
+          <p:cNvPr id="2" name="Заголовок 1"/>
+          <p:cNvSpPr>
+            <a:spLocks noGrp="1"/>
+          </p:cNvSpPr>
+          <p:nvPr>
+            <p:ph type="title"/>
+          </p:nvPr>
+        </p:nvSpPr>
+        <p:spPr/>
+        <p:txBody>
+          <a:bodyPr/>
+          <a:lstStyle/>
+          <a:p>
+            <a:r>
+              <a:rPr lang="en-US" dirty="0" err="1" smtClean="0"/>
+              <a:t>NuGet</a:t>
+            </a:r>
+            <a:endParaRPr lang="ru-RU" dirty="0"/>
+          </a:p>
+        </p:txBody>
+      </p:sp>
+      <p:pic>
+        <p:nvPicPr>
+          <p:cNvPr id="4" name="Объект 3"/>
+          <p:cNvPicPr>
+            <a:picLocks noGrp="1" noChangeAspect="1"/>
+          </p:cNvPicPr>
+          <p:nvPr>
+            <p:ph idx="1"/>
+          </p:nvPr>
+        </p:nvPicPr>
+        <p:blipFill>
+          <a:blip r:embed="rId2"/>
+          <a:stretch>
+            <a:fillRect/>
+          </a:stretch>
+        </p:blipFill>
+        <p:spPr>
+          <a:xfrm>
+            <a:off x="1539718" y="1690689"/>
+            <a:ext cx="6064564" cy="4737416"/>
+          </a:xfrm>
+          <a:prstGeom prst="rect">
+            <a:avLst/>
+          </a:prstGeom>
+        </p:spPr>
+      </p:pic>
+      <p:sp>
+        <p:nvSpPr>
+          <p:cNvPr id="5" name="Стрелка вправо 4"/>
+          <p:cNvSpPr/>
+          <p:nvPr/>
+        </p:nvSpPr>
+        <p:spPr>
+          <a:xfrm flipH="1">
+            <a:off x="5971922" y="3422931"/>
+            <a:ext cx="1521303" cy="571730"/>
+          </a:xfrm>
+          <a:prstGeom prst="rightArrow">
+            <a:avLst/>
+          </a:prstGeom>
+        </p:spPr>
+        <p:style>
+          <a:lnRef idx="2">
+            <a:schemeClr val="accent2">
+              <a:shade val="50000"/>
+            </a:schemeClr>
+          </a:lnRef>
+          <a:fillRef idx="1">
+            <a:schemeClr val="accent2"/>
+          </a:fillRef>
+          <a:effectRef idx="0">
+            <a:schemeClr val="accent2"/>
+          </a:effectRef>
+          <a:fontRef idx="minor">
+            <a:schemeClr val="lt1"/>
+          </a:fontRef>
+        </p:style>
+        <p:txBody>
+          <a:bodyPr rtlCol="0" anchor="ctr"/>
+          <a:lstStyle/>
+          <a:p>
+            <a:pPr algn="ctr"/>
+            <a:endParaRPr lang="ru-RU"/>
+          </a:p>
+        </p:txBody>
+      </p:sp>
+    </p:spTree>
+    <p:extLst>
+      <p:ext uri="{BB962C8B-B14F-4D97-AF65-F5344CB8AC3E}">
+        <p14:creationId xmlns:p14="http://schemas.microsoft.com/office/powerpoint/2010/main" val="934359497"/>
+      </p:ext>
+    </p:extLst>
+  </p:cSld>
+  <p:clrMapOvr>
+    <a:masterClrMapping/>
+  </p:clrMapOvr>
+</p:sld>
+</file>
+
+<file path=ppt/slides/slide22.xml><?xml version="1.0" encoding="utf-8"?>
+<p:sld xmlns:a="http://schemas.openxmlformats.org/drawingml/2006/main" xmlns:r="http://schemas.openxmlformats.org/officeDocument/2006/relationships" xmlns:p="http://schemas.openxmlformats.org/presentationml/2006/main">
+  <p:cSld>
+    <p:spTree>
+      <p:nvGrpSpPr>
+        <p:cNvPr id="1" name=""/>
+        <p:cNvGrpSpPr/>
+        <p:nvPr/>
+      </p:nvGrpSpPr>
+      <p:grpSpPr>
+        <a:xfrm>
+          <a:off x="0" y="0"/>
+          <a:ext cx="0" cy="0"/>
+          <a:chOff x="0" y="0"/>
+          <a:chExt cx="0" cy="0"/>
+        </a:xfrm>
+      </p:grpSpPr>
+      <p:sp>
+        <p:nvSpPr>
+          <p:cNvPr id="2" name="Заголовок 1"/>
+          <p:cNvSpPr>
+            <a:spLocks noGrp="1"/>
+          </p:cNvSpPr>
+          <p:nvPr>
+            <p:ph type="title"/>
+          </p:nvPr>
+        </p:nvSpPr>
+        <p:spPr/>
+        <p:txBody>
+          <a:bodyPr/>
+          <a:lstStyle/>
+          <a:p>
+            <a:r>
+              <a:rPr lang="ru-RU" dirty="0" smtClean="0"/>
+              <a:t>Что-то не так со сборками...</a:t>
+            </a:r>
+            <a:endParaRPr lang="ru-RU" dirty="0"/>
+          </a:p>
+        </p:txBody>
+      </p:sp>
+      <p:sp>
+        <p:nvSpPr>
+          <p:cNvPr id="3" name="Объект 2"/>
+          <p:cNvSpPr>
+            <a:spLocks noGrp="1"/>
+          </p:cNvSpPr>
+          <p:nvPr>
+            <p:ph idx="1"/>
+          </p:nvPr>
+        </p:nvSpPr>
+        <p:spPr/>
+        <p:txBody>
+          <a:bodyPr/>
+          <a:lstStyle/>
+          <a:p>
+            <a:pPr marL="0" indent="0">
+              <a:buNone/>
+            </a:pPr>
+            <a:r>
+              <a:rPr lang="ru-RU" dirty="0" smtClean="0"/>
+              <a:t>*</a:t>
+            </a:r>
+            <a:r>
+              <a:rPr lang="en-US" dirty="0" smtClean="0"/>
+              <a:t>.</a:t>
+            </a:r>
+            <a:r>
+              <a:rPr lang="en-US" dirty="0" err="1" smtClean="0"/>
+              <a:t>csproj</a:t>
+            </a:r>
+            <a:endParaRPr lang="en-US" dirty="0" smtClean="0"/>
+          </a:p>
+          <a:p>
+            <a:pPr marL="0" indent="0">
+              <a:buNone/>
+            </a:pPr>
+            <a:endParaRPr lang="ru-RU" dirty="0"/>
+          </a:p>
+        </p:txBody>
+      </p:sp>
+      <p:pic>
+        <p:nvPicPr>
+          <p:cNvPr id="4" name="Рисунок 3"/>
+          <p:cNvPicPr>
+            <a:picLocks noChangeAspect="1"/>
+          </p:cNvPicPr>
+          <p:nvPr/>
+        </p:nvPicPr>
+        <p:blipFill>
+          <a:blip r:embed="rId2"/>
+          <a:stretch>
+            <a:fillRect/>
+          </a:stretch>
+        </p:blipFill>
+        <p:spPr>
+          <a:xfrm>
+            <a:off x="628650" y="2389046"/>
+            <a:ext cx="8000950" cy="1559867"/>
+          </a:xfrm>
+          <a:prstGeom prst="rect">
+            <a:avLst/>
+          </a:prstGeom>
+        </p:spPr>
+      </p:pic>
+      <p:sp>
+        <p:nvSpPr>
+          <p:cNvPr id="5" name="Стрелка вправо 4"/>
+          <p:cNvSpPr/>
+          <p:nvPr/>
+        </p:nvSpPr>
+        <p:spPr>
+          <a:xfrm rot="3193351" flipH="1">
+            <a:off x="4758117" y="3580998"/>
+            <a:ext cx="1521303" cy="571730"/>
+          </a:xfrm>
+          <a:prstGeom prst="rightArrow">
+            <a:avLst/>
+          </a:prstGeom>
+        </p:spPr>
+        <p:style>
+          <a:lnRef idx="2">
+            <a:schemeClr val="accent2">
+              <a:shade val="50000"/>
+            </a:schemeClr>
+          </a:lnRef>
+          <a:fillRef idx="1">
+            <a:schemeClr val="accent2"/>
+          </a:fillRef>
+          <a:effectRef idx="0">
+            <a:schemeClr val="accent2"/>
+          </a:effectRef>
+          <a:fontRef idx="minor">
+            <a:schemeClr val="lt1"/>
+          </a:fontRef>
+        </p:style>
+        <p:txBody>
+          <a:bodyPr rtlCol="0" anchor="ctr"/>
+          <a:lstStyle/>
+          <a:p>
+            <a:pPr algn="ctr"/>
+            <a:endParaRPr lang="ru-RU"/>
+          </a:p>
+        </p:txBody>
+      </p:sp>
+    </p:spTree>
+    <p:extLst>
+      <p:ext uri="{BB962C8B-B14F-4D97-AF65-F5344CB8AC3E}">
+        <p14:creationId xmlns:p14="http://schemas.microsoft.com/office/powerpoint/2010/main" val="3242772319"/>
+      </p:ext>
+    </p:extLst>
+  </p:cSld>
+  <p:clrMapOvr>
+    <a:masterClrMapping/>
+  </p:clrMapOvr>
+</p:sld>
+</file>
+
+<file path=ppt/slides/slide23.xml><?xml version="1.0" encoding="utf-8"?>
+<p:sld xmlns:a="http://schemas.openxmlformats.org/drawingml/2006/main" xmlns:r="http://schemas.openxmlformats.org/officeDocument/2006/relationships" xmlns:p="http://schemas.openxmlformats.org/presentationml/2006/main">
+  <p:cSld>
+    <p:spTree>
+      <p:nvGrpSpPr>
+        <p:cNvPr id="1" name=""/>
+        <p:cNvGrpSpPr/>
+        <p:nvPr/>
+      </p:nvGrpSpPr>
+      <p:grpSpPr>
+        <a:xfrm>
+          <a:off x="0" y="0"/>
+          <a:ext cx="0" cy="0"/>
+          <a:chOff x="0" y="0"/>
+          <a:chExt cx="0" cy="0"/>
+        </a:xfrm>
+      </p:grpSpPr>
+      <p:sp>
+        <p:nvSpPr>
+          <p:cNvPr id="2" name="Заголовок 1"/>
+          <p:cNvSpPr>
+            <a:spLocks noGrp="1"/>
+          </p:cNvSpPr>
+          <p:nvPr>
+            <p:ph type="title"/>
+          </p:nvPr>
+        </p:nvSpPr>
+        <p:spPr/>
+        <p:txBody>
+          <a:bodyPr/>
+          <a:lstStyle/>
+          <a:p>
+            <a:r>
+              <a:rPr lang="ru-RU" dirty="0" smtClean="0"/>
+              <a:t>Что-то не так со сборками...</a:t>
+            </a:r>
+            <a:endParaRPr lang="ru-RU" dirty="0"/>
+          </a:p>
+        </p:txBody>
+      </p:sp>
+      <p:sp>
+        <p:nvSpPr>
+          <p:cNvPr id="3" name="Объект 2"/>
+          <p:cNvSpPr>
+            <a:spLocks noGrp="1"/>
+          </p:cNvSpPr>
+          <p:nvPr>
+            <p:ph idx="1"/>
+          </p:nvPr>
+        </p:nvSpPr>
+        <p:spPr/>
+        <p:txBody>
+          <a:bodyPr/>
+          <a:lstStyle/>
+          <a:p>
+            <a:pPr marL="0" indent="0">
+              <a:buNone/>
+            </a:pPr>
+            <a:r>
+              <a:rPr lang="en-US" dirty="0" smtClean="0"/>
+              <a:t>Solution Explorer | References | Properties</a:t>
+            </a:r>
+          </a:p>
+          <a:p>
+            <a:pPr marL="0" indent="0">
+              <a:buNone/>
+            </a:pPr>
+            <a:endParaRPr lang="ru-RU" dirty="0"/>
+          </a:p>
+        </p:txBody>
+      </p:sp>
+      <p:pic>
+        <p:nvPicPr>
+          <p:cNvPr id="5" name="Рисунок 4"/>
+          <p:cNvPicPr>
+            <a:picLocks noChangeAspect="1"/>
+          </p:cNvPicPr>
+          <p:nvPr/>
+        </p:nvPicPr>
+        <p:blipFill>
+          <a:blip r:embed="rId2"/>
+          <a:stretch>
+            <a:fillRect/>
+          </a:stretch>
+        </p:blipFill>
+        <p:spPr>
+          <a:xfrm>
+            <a:off x="628650" y="2336617"/>
+            <a:ext cx="7886700" cy="4300771"/>
+          </a:xfrm>
+          <a:prstGeom prst="rect">
+            <a:avLst/>
+          </a:prstGeom>
+        </p:spPr>
+      </p:pic>
+      <p:sp>
+        <p:nvSpPr>
+          <p:cNvPr id="6" name="Стрелка вправо 5"/>
+          <p:cNvSpPr/>
+          <p:nvPr/>
+        </p:nvSpPr>
+        <p:spPr>
+          <a:xfrm rot="17950571" flipH="1">
+            <a:off x="5429756" y="3961324"/>
+            <a:ext cx="1521303" cy="571730"/>
+          </a:xfrm>
+          <a:prstGeom prst="rightArrow">
+            <a:avLst/>
+          </a:prstGeom>
+        </p:spPr>
+        <p:style>
+          <a:lnRef idx="2">
+            <a:schemeClr val="accent2">
+              <a:shade val="50000"/>
+            </a:schemeClr>
+          </a:lnRef>
+          <a:fillRef idx="1">
+            <a:schemeClr val="accent2"/>
+          </a:fillRef>
+          <a:effectRef idx="0">
+            <a:schemeClr val="accent2"/>
+          </a:effectRef>
+          <a:fontRef idx="minor">
+            <a:schemeClr val="lt1"/>
+          </a:fontRef>
+        </p:style>
+        <p:txBody>
+          <a:bodyPr rtlCol="0" anchor="ctr"/>
+          <a:lstStyle/>
+          <a:p>
+            <a:pPr algn="ctr"/>
+            <a:endParaRPr lang="ru-RU"/>
+          </a:p>
+        </p:txBody>
+      </p:sp>
+    </p:spTree>
+    <p:extLst>
+      <p:ext uri="{BB962C8B-B14F-4D97-AF65-F5344CB8AC3E}">
+        <p14:creationId xmlns:p14="http://schemas.microsoft.com/office/powerpoint/2010/main" val="3794894227"/>
+      </p:ext>
+    </p:extLst>
+  </p:cSld>
+  <p:clrMapOvr>
+    <a:masterClrMapping/>
+  </p:clrMapOvr>
+</p:sld>
+</file>
+
+<file path=ppt/slides/slide24.xml><?xml version="1.0" encoding="utf-8"?>
+<p:sld xmlns:a="http://schemas.openxmlformats.org/drawingml/2006/main" xmlns:r="http://schemas.openxmlformats.org/officeDocument/2006/relationships" xmlns:p="http://schemas.openxmlformats.org/presentationml/2006/main">
+  <p:cSld>
+    <p:spTree>
+      <p:nvGrpSpPr>
+        <p:cNvPr id="1" name=""/>
+        <p:cNvGrpSpPr/>
+        <p:nvPr/>
+      </p:nvGrpSpPr>
+      <p:grpSpPr>
+        <a:xfrm>
+          <a:off x="0" y="0"/>
+          <a:ext cx="0" cy="0"/>
+          <a:chOff x="0" y="0"/>
+          <a:chExt cx="0" cy="0"/>
+        </a:xfrm>
+      </p:grpSpPr>
+      <p:sp>
+        <p:nvSpPr>
+          <p:cNvPr id="2" name="Заголовок 1"/>
+          <p:cNvSpPr>
+            <a:spLocks noGrp="1"/>
+          </p:cNvSpPr>
+          <p:nvPr>
+            <p:ph type="title"/>
+          </p:nvPr>
+        </p:nvSpPr>
+        <p:spPr/>
+        <p:txBody>
+          <a:bodyPr/>
+          <a:lstStyle/>
+          <a:p>
+            <a:r>
+              <a:rPr lang="ru-RU" dirty="0" smtClean="0"/>
+              <a:t>Что-то не так с </a:t>
+            </a:r>
+            <a:r>
+              <a:rPr lang="en-US" dirty="0" err="1" smtClean="0"/>
+              <a:t>NuGet</a:t>
+            </a:r>
+            <a:endParaRPr lang="ru-RU" dirty="0"/>
+          </a:p>
+        </p:txBody>
+      </p:sp>
+      <p:sp>
+        <p:nvSpPr>
+          <p:cNvPr id="3" name="Объект 2"/>
+          <p:cNvSpPr>
+            <a:spLocks noGrp="1"/>
+          </p:cNvSpPr>
+          <p:nvPr>
+            <p:ph idx="1"/>
+          </p:nvPr>
+        </p:nvSpPr>
+        <p:spPr/>
+        <p:txBody>
+          <a:bodyPr/>
+          <a:lstStyle/>
+          <a:p>
+            <a:pPr marL="0" indent="0">
+              <a:buNone/>
+            </a:pPr>
+            <a:r>
+              <a:rPr lang="en-US" dirty="0" err="1" smtClean="0"/>
+              <a:t>packages.config</a:t>
+            </a:r>
+            <a:r>
+              <a:rPr lang="en-US" dirty="0" smtClean="0"/>
+              <a:t> </a:t>
+            </a:r>
+            <a:r>
+              <a:rPr lang="ru-RU" dirty="0" smtClean="0"/>
+              <a:t>и директория </a:t>
+            </a:r>
+            <a:r>
+              <a:rPr lang="en-US" dirty="0" smtClean="0"/>
+              <a:t>packages</a:t>
+            </a:r>
+          </a:p>
+          <a:p>
+            <a:pPr marL="0" indent="0">
+              <a:buNone/>
+            </a:pPr>
+            <a:endParaRPr lang="ru-RU" dirty="0"/>
+          </a:p>
+        </p:txBody>
+      </p:sp>
+      <p:pic>
+        <p:nvPicPr>
+          <p:cNvPr id="4" name="Рисунок 3"/>
+          <p:cNvPicPr>
+            <a:picLocks noChangeAspect="1"/>
+          </p:cNvPicPr>
+          <p:nvPr/>
+        </p:nvPicPr>
+        <p:blipFill>
+          <a:blip r:embed="rId2"/>
+          <a:stretch>
+            <a:fillRect/>
+          </a:stretch>
+        </p:blipFill>
+        <p:spPr>
+          <a:xfrm>
+            <a:off x="628650" y="2416947"/>
+            <a:ext cx="6969350" cy="2340770"/>
+          </a:xfrm>
+          <a:prstGeom prst="rect">
+            <a:avLst/>
+          </a:prstGeom>
+        </p:spPr>
+      </p:pic>
+    </p:spTree>
+    <p:extLst>
+      <p:ext uri="{BB962C8B-B14F-4D97-AF65-F5344CB8AC3E}">
+        <p14:creationId xmlns:p14="http://schemas.microsoft.com/office/powerpoint/2010/main" val="1305967174"/>
+      </p:ext>
+    </p:extLst>
+  </p:cSld>
+  <p:clrMapOvr>
+    <a:masterClrMapping/>
+  </p:clrMapOvr>
 </p:sld>
 </file>
 
@@ -4860,11 +5891,7 @@
             </a:pPr>
             <a:r>
               <a:rPr lang="en-US" dirty="0" smtClean="0"/>
-              <a:t>&gt; </a:t>
-            </a:r>
-            <a:r>
-              <a:rPr lang="en-US" dirty="0" smtClean="0"/>
-              <a:t>curl --help | </a:t>
+              <a:t>&gt; curl --help | </a:t>
             </a:r>
             <a:r>
               <a:rPr lang="en-US" dirty="0" err="1" smtClean="0"/>
@@ -4881,15 +5908,7 @@
             </a:pPr>
             <a:r>
               <a:rPr lang="en-US" dirty="0" smtClean="0"/>
-              <a:t>&gt; cat </a:t>
-            </a:r>
-            <a:r>
-              <a:rPr lang="en-US" dirty="0" smtClean="0"/>
-              <a:t>*.log | cut -</a:t>
-            </a:r>
-            <a:r>
-              <a:rPr lang="en-US" dirty="0" smtClean="0"/>
-              <a:t>f1</a:t>
+              <a:t>&gt; cat *.log | cut -f1</a:t>
             </a:r>
             <a:endParaRPr lang="ru-RU" dirty="0" smtClean="0"/>
           </a:p>

</xml_diff>